<commit_message>
fixed svm and update ppt
</commit_message>
<xml_diff>
--- a/Face Recognition Algorithm Based on VGG Network Model.pptx
+++ b/Face Recognition Algorithm Based on VGG Network Model.pptx
@@ -8,13 +8,18 @@
     <p:sldId id="256" r:id="rId2"/>
     <p:sldId id="258" r:id="rId3"/>
     <p:sldId id="259" r:id="rId4"/>
-    <p:sldId id="260" r:id="rId5"/>
-    <p:sldId id="261" r:id="rId6"/>
-    <p:sldId id="262" r:id="rId7"/>
-    <p:sldId id="263" r:id="rId8"/>
-    <p:sldId id="264" r:id="rId9"/>
-    <p:sldId id="265" r:id="rId10"/>
-    <p:sldId id="257" r:id="rId11"/>
+    <p:sldId id="266" r:id="rId5"/>
+    <p:sldId id="260" r:id="rId6"/>
+    <p:sldId id="261" r:id="rId7"/>
+    <p:sldId id="267" r:id="rId8"/>
+    <p:sldId id="268" r:id="rId9"/>
+    <p:sldId id="263" r:id="rId10"/>
+    <p:sldId id="262" r:id="rId11"/>
+    <p:sldId id="264" r:id="rId12"/>
+    <p:sldId id="269" r:id="rId13"/>
+    <p:sldId id="270" r:id="rId14"/>
+    <p:sldId id="265" r:id="rId15"/>
+    <p:sldId id="257" r:id="rId16"/>
   </p:sldIdLst>
   <p:sldSz cx="12192000" cy="6858000"/>
   <p:notesSz cx="6858000" cy="9144000"/>
@@ -252,7 +257,7 @@
           <a:p>
             <a:fld id="{A9D72E2C-C581-45C7-8729-02149165DC38}" type="datetimeFigureOut">
               <a:rPr lang="en-US" smtClean="0"/>
-              <a:t>10/17/2020</a:t>
+              <a:t>10/18/2020</a:t>
             </a:fld>
             <a:endParaRPr lang="en-US"/>
           </a:p>
@@ -422,7 +427,7 @@
           <a:p>
             <a:fld id="{A9D72E2C-C581-45C7-8729-02149165DC38}" type="datetimeFigureOut">
               <a:rPr lang="en-US" smtClean="0"/>
-              <a:t>10/17/2020</a:t>
+              <a:t>10/18/2020</a:t>
             </a:fld>
             <a:endParaRPr lang="en-US"/>
           </a:p>
@@ -602,7 +607,7 @@
           <a:p>
             <a:fld id="{A9D72E2C-C581-45C7-8729-02149165DC38}" type="datetimeFigureOut">
               <a:rPr lang="en-US" smtClean="0"/>
-              <a:t>10/17/2020</a:t>
+              <a:t>10/18/2020</a:t>
             </a:fld>
             <a:endParaRPr lang="en-US"/>
           </a:p>
@@ -772,7 +777,7 @@
           <a:p>
             <a:fld id="{A9D72E2C-C581-45C7-8729-02149165DC38}" type="datetimeFigureOut">
               <a:rPr lang="en-US" smtClean="0"/>
-              <a:t>10/17/2020</a:t>
+              <a:t>10/18/2020</a:t>
             </a:fld>
             <a:endParaRPr lang="en-US"/>
           </a:p>
@@ -1018,7 +1023,7 @@
           <a:p>
             <a:fld id="{A9D72E2C-C581-45C7-8729-02149165DC38}" type="datetimeFigureOut">
               <a:rPr lang="en-US" smtClean="0"/>
-              <a:t>10/17/2020</a:t>
+              <a:t>10/18/2020</a:t>
             </a:fld>
             <a:endParaRPr lang="en-US"/>
           </a:p>
@@ -1250,7 +1255,7 @@
           <a:p>
             <a:fld id="{A9D72E2C-C581-45C7-8729-02149165DC38}" type="datetimeFigureOut">
               <a:rPr lang="en-US" smtClean="0"/>
-              <a:t>10/17/2020</a:t>
+              <a:t>10/18/2020</a:t>
             </a:fld>
             <a:endParaRPr lang="en-US"/>
           </a:p>
@@ -1617,7 +1622,7 @@
           <a:p>
             <a:fld id="{A9D72E2C-C581-45C7-8729-02149165DC38}" type="datetimeFigureOut">
               <a:rPr lang="en-US" smtClean="0"/>
-              <a:t>10/17/2020</a:t>
+              <a:t>10/18/2020</a:t>
             </a:fld>
             <a:endParaRPr lang="en-US"/>
           </a:p>
@@ -1735,7 +1740,7 @@
           <a:p>
             <a:fld id="{A9D72E2C-C581-45C7-8729-02149165DC38}" type="datetimeFigureOut">
               <a:rPr lang="en-US" smtClean="0"/>
-              <a:t>10/17/2020</a:t>
+              <a:t>10/18/2020</a:t>
             </a:fld>
             <a:endParaRPr lang="en-US"/>
           </a:p>
@@ -1830,7 +1835,7 @@
           <a:p>
             <a:fld id="{A9D72E2C-C581-45C7-8729-02149165DC38}" type="datetimeFigureOut">
               <a:rPr lang="en-US" smtClean="0"/>
-              <a:t>10/17/2020</a:t>
+              <a:t>10/18/2020</a:t>
             </a:fld>
             <a:endParaRPr lang="en-US"/>
           </a:p>
@@ -2107,7 +2112,7 @@
           <a:p>
             <a:fld id="{A9D72E2C-C581-45C7-8729-02149165DC38}" type="datetimeFigureOut">
               <a:rPr lang="en-US" smtClean="0"/>
-              <a:t>10/17/2020</a:t>
+              <a:t>10/18/2020</a:t>
             </a:fld>
             <a:endParaRPr lang="en-US"/>
           </a:p>
@@ -2360,7 +2365,7 @@
           <a:p>
             <a:fld id="{A9D72E2C-C581-45C7-8729-02149165DC38}" type="datetimeFigureOut">
               <a:rPr lang="en-US" smtClean="0"/>
-              <a:t>10/17/2020</a:t>
+              <a:t>10/18/2020</a:t>
             </a:fld>
             <a:endParaRPr lang="en-US"/>
           </a:p>
@@ -2573,7 +2578,7 @@
           <a:p>
             <a:fld id="{A9D72E2C-C581-45C7-8729-02149165DC38}" type="datetimeFigureOut">
               <a:rPr lang="en-US" smtClean="0"/>
-              <a:t>10/17/2020</a:t>
+              <a:t>10/18/2020</a:t>
             </a:fld>
             <a:endParaRPr lang="en-US"/>
           </a:p>
@@ -3089,6 +3094,448 @@
           <a:lstStyle/>
           <a:p>
             <a:r>
+              <a:rPr lang="vi-VN" dirty="0" smtClean="0"/>
+              <a:t>Softmax </a:t>
+            </a:r>
+            <a:r>
+              <a:rPr lang="vi-VN" dirty="0" smtClean="0"/>
+              <a:t>function</a:t>
+            </a:r>
+            <a:r>
+              <a:rPr lang="en-US" dirty="0" smtClean="0"/>
+              <a:t>( Normalization)</a:t>
+            </a:r>
+            <a:endParaRPr lang="en-US" dirty="0"/>
+          </a:p>
+        </p:txBody>
+      </p:sp>
+      <p:pic>
+        <p:nvPicPr>
+          <p:cNvPr id="3074" name="Picture 2" descr="Image for post"/>
+          <p:cNvPicPr>
+            <a:picLocks noGrp="1" noChangeAspect="1" noChangeArrowheads="1"/>
+          </p:cNvPicPr>
+          <p:nvPr>
+            <p:ph idx="1"/>
+          </p:nvPr>
+        </p:nvPicPr>
+        <p:blipFill>
+          <a:blip r:embed="rId2">
+            <a:extLst>
+              <a:ext uri="{28A0092B-C50C-407E-A947-70E740481C1C}">
+                <a14:useLocalDpi xmlns:a14="http://schemas.microsoft.com/office/drawing/2010/main" val="0"/>
+              </a:ext>
+            </a:extLst>
+          </a:blip>
+          <a:srcRect/>
+          <a:stretch>
+            <a:fillRect/>
+          </a:stretch>
+        </p:blipFill>
+        <p:spPr bwMode="auto">
+          <a:xfrm>
+            <a:off x="3957637" y="2991644"/>
+            <a:ext cx="4276725" cy="2019300"/>
+          </a:xfrm>
+          <a:prstGeom prst="rect">
+            <a:avLst/>
+          </a:prstGeom>
+          <a:noFill/>
+          <a:extLst>
+            <a:ext uri="{909E8E84-426E-40DD-AFC4-6F175D3DCCD1}">
+              <a14:hiddenFill xmlns:a14="http://schemas.microsoft.com/office/drawing/2010/main">
+                <a:solidFill>
+                  <a:srgbClr val="FFFFFF"/>
+                </a:solidFill>
+              </a14:hiddenFill>
+            </a:ext>
+          </a:extLst>
+        </p:spPr>
+      </p:pic>
+    </p:spTree>
+    <p:extLst>
+      <p:ext uri="{BB962C8B-B14F-4D97-AF65-F5344CB8AC3E}">
+        <p14:creationId xmlns:p14="http://schemas.microsoft.com/office/powerpoint/2010/main" val="4257556904"/>
+      </p:ext>
+    </p:extLst>
+  </p:cSld>
+  <p:clrMapOvr>
+    <a:masterClrMapping/>
+  </p:clrMapOvr>
+</p:sld>
+</file>
+
+<file path=ppt/slides/slide11.xml><?xml version="1.0" encoding="utf-8"?>
+<p:sld xmlns:a="http://schemas.openxmlformats.org/drawingml/2006/main" xmlns:r="http://schemas.openxmlformats.org/officeDocument/2006/relationships" xmlns:p="http://schemas.openxmlformats.org/presentationml/2006/main">
+  <p:cSld>
+    <p:spTree>
+      <p:nvGrpSpPr>
+        <p:cNvPr id="1" name=""/>
+        <p:cNvGrpSpPr/>
+        <p:nvPr/>
+      </p:nvGrpSpPr>
+      <p:grpSpPr>
+        <a:xfrm>
+          <a:off x="0" y="0"/>
+          <a:ext cx="0" cy="0"/>
+          <a:chOff x="0" y="0"/>
+          <a:chExt cx="0" cy="0"/>
+        </a:xfrm>
+      </p:grpSpPr>
+      <p:sp>
+        <p:nvSpPr>
+          <p:cNvPr id="2" name="Title 1"/>
+          <p:cNvSpPr>
+            <a:spLocks noGrp="1"/>
+          </p:cNvSpPr>
+          <p:nvPr>
+            <p:ph type="title"/>
+          </p:nvPr>
+        </p:nvSpPr>
+        <p:spPr/>
+        <p:txBody>
+          <a:bodyPr/>
+          <a:lstStyle/>
+          <a:p>
+            <a:r>
+              <a:rPr lang="vi-VN" dirty="0" smtClean="0"/>
+              <a:t>Fully connected layer </a:t>
+            </a:r>
+            <a:endParaRPr lang="en-US" dirty="0"/>
+          </a:p>
+        </p:txBody>
+      </p:sp>
+      <p:pic>
+        <p:nvPicPr>
+          <p:cNvPr id="5122" name="Picture 2" descr="Image for post"/>
+          <p:cNvPicPr>
+            <a:picLocks noGrp="1" noChangeAspect="1" noChangeArrowheads="1"/>
+          </p:cNvPicPr>
+          <p:nvPr>
+            <p:ph idx="1"/>
+          </p:nvPr>
+        </p:nvPicPr>
+        <p:blipFill>
+          <a:blip r:embed="rId2">
+            <a:extLst>
+              <a:ext uri="{28A0092B-C50C-407E-A947-70E740481C1C}">
+                <a14:useLocalDpi xmlns:a14="http://schemas.microsoft.com/office/drawing/2010/main" val="0"/>
+              </a:ext>
+            </a:extLst>
+          </a:blip>
+          <a:srcRect/>
+          <a:stretch>
+            <a:fillRect/>
+          </a:stretch>
+        </p:blipFill>
+        <p:spPr bwMode="auto">
+          <a:xfrm>
+            <a:off x="3457575" y="2572544"/>
+            <a:ext cx="5276850" cy="2857500"/>
+          </a:xfrm>
+          <a:prstGeom prst="rect">
+            <a:avLst/>
+          </a:prstGeom>
+          <a:noFill/>
+          <a:extLst>
+            <a:ext uri="{909E8E84-426E-40DD-AFC4-6F175D3DCCD1}">
+              <a14:hiddenFill xmlns:a14="http://schemas.microsoft.com/office/drawing/2010/main">
+                <a:solidFill>
+                  <a:srgbClr val="FFFFFF"/>
+                </a:solidFill>
+              </a14:hiddenFill>
+            </a:ext>
+          </a:extLst>
+        </p:spPr>
+      </p:pic>
+    </p:spTree>
+    <p:extLst>
+      <p:ext uri="{BB962C8B-B14F-4D97-AF65-F5344CB8AC3E}">
+        <p14:creationId xmlns:p14="http://schemas.microsoft.com/office/powerpoint/2010/main" val="3594928109"/>
+      </p:ext>
+    </p:extLst>
+  </p:cSld>
+  <p:clrMapOvr>
+    <a:masterClrMapping/>
+  </p:clrMapOvr>
+</p:sld>
+</file>
+
+<file path=ppt/slides/slide12.xml><?xml version="1.0" encoding="utf-8"?>
+<p:sld xmlns:a="http://schemas.openxmlformats.org/drawingml/2006/main" xmlns:r="http://schemas.openxmlformats.org/officeDocument/2006/relationships" xmlns:p="http://schemas.openxmlformats.org/presentationml/2006/main">
+  <p:cSld>
+    <p:spTree>
+      <p:nvGrpSpPr>
+        <p:cNvPr id="1" name=""/>
+        <p:cNvGrpSpPr/>
+        <p:nvPr/>
+      </p:nvGrpSpPr>
+      <p:grpSpPr>
+        <a:xfrm>
+          <a:off x="0" y="0"/>
+          <a:ext cx="0" cy="0"/>
+          <a:chOff x="0" y="0"/>
+          <a:chExt cx="0" cy="0"/>
+        </a:xfrm>
+      </p:grpSpPr>
+      <p:sp>
+        <p:nvSpPr>
+          <p:cNvPr id="2" name="Title 1"/>
+          <p:cNvSpPr>
+            <a:spLocks noGrp="1"/>
+          </p:cNvSpPr>
+          <p:nvPr>
+            <p:ph type="title"/>
+          </p:nvPr>
+        </p:nvSpPr>
+        <p:spPr/>
+        <p:txBody>
+          <a:bodyPr/>
+          <a:lstStyle/>
+          <a:p>
+            <a:endParaRPr lang="en-US"/>
+          </a:p>
+        </p:txBody>
+      </p:sp>
+      <p:pic>
+        <p:nvPicPr>
+          <p:cNvPr id="5" name="Content Placeholder 4"/>
+          <p:cNvPicPr>
+            <a:picLocks noGrp="1" noChangeAspect="1"/>
+          </p:cNvPicPr>
+          <p:nvPr>
+            <p:ph idx="1"/>
+          </p:nvPr>
+        </p:nvPicPr>
+        <p:blipFill>
+          <a:blip r:embed="rId2"/>
+          <a:stretch>
+            <a:fillRect/>
+          </a:stretch>
+        </p:blipFill>
+        <p:spPr>
+          <a:xfrm>
+            <a:off x="0" y="0"/>
+            <a:ext cx="12192000" cy="6858000"/>
+          </a:xfrm>
+          <a:prstGeom prst="rect">
+            <a:avLst/>
+          </a:prstGeom>
+        </p:spPr>
+      </p:pic>
+    </p:spTree>
+    <p:extLst>
+      <p:ext uri="{BB962C8B-B14F-4D97-AF65-F5344CB8AC3E}">
+        <p14:creationId xmlns:p14="http://schemas.microsoft.com/office/powerpoint/2010/main" val="2544249161"/>
+      </p:ext>
+    </p:extLst>
+  </p:cSld>
+  <p:clrMapOvr>
+    <a:masterClrMapping/>
+  </p:clrMapOvr>
+</p:sld>
+</file>
+
+<file path=ppt/slides/slide13.xml><?xml version="1.0" encoding="utf-8"?>
+<p:sld xmlns:a="http://schemas.openxmlformats.org/drawingml/2006/main" xmlns:r="http://schemas.openxmlformats.org/officeDocument/2006/relationships" xmlns:p="http://schemas.openxmlformats.org/presentationml/2006/main">
+  <p:cSld>
+    <p:spTree>
+      <p:nvGrpSpPr>
+        <p:cNvPr id="1" name=""/>
+        <p:cNvGrpSpPr/>
+        <p:nvPr/>
+      </p:nvGrpSpPr>
+      <p:grpSpPr>
+        <a:xfrm>
+          <a:off x="0" y="0"/>
+          <a:ext cx="0" cy="0"/>
+          <a:chOff x="0" y="0"/>
+          <a:chExt cx="0" cy="0"/>
+        </a:xfrm>
+      </p:grpSpPr>
+      <p:sp>
+        <p:nvSpPr>
+          <p:cNvPr id="2" name="Title 1"/>
+          <p:cNvSpPr>
+            <a:spLocks noGrp="1"/>
+          </p:cNvSpPr>
+          <p:nvPr>
+            <p:ph type="title"/>
+          </p:nvPr>
+        </p:nvSpPr>
+        <p:spPr/>
+        <p:txBody>
+          <a:bodyPr/>
+          <a:lstStyle/>
+          <a:p>
+            <a:endParaRPr lang="en-US"/>
+          </a:p>
+        </p:txBody>
+      </p:sp>
+      <p:pic>
+        <p:nvPicPr>
+          <p:cNvPr id="4" name="Content Placeholder 3"/>
+          <p:cNvPicPr>
+            <a:picLocks noGrp="1" noChangeAspect="1"/>
+          </p:cNvPicPr>
+          <p:nvPr>
+            <p:ph idx="1"/>
+          </p:nvPr>
+        </p:nvPicPr>
+        <p:blipFill>
+          <a:blip r:embed="rId2"/>
+          <a:stretch>
+            <a:fillRect/>
+          </a:stretch>
+        </p:blipFill>
+        <p:spPr>
+          <a:xfrm>
+            <a:off x="0" y="0"/>
+            <a:ext cx="12192000" cy="6858000"/>
+          </a:xfrm>
+          <a:prstGeom prst="rect">
+            <a:avLst/>
+          </a:prstGeom>
+        </p:spPr>
+      </p:pic>
+    </p:spTree>
+    <p:extLst>
+      <p:ext uri="{BB962C8B-B14F-4D97-AF65-F5344CB8AC3E}">
+        <p14:creationId xmlns:p14="http://schemas.microsoft.com/office/powerpoint/2010/main" val="2109874004"/>
+      </p:ext>
+    </p:extLst>
+  </p:cSld>
+  <p:clrMapOvr>
+    <a:masterClrMapping/>
+  </p:clrMapOvr>
+</p:sld>
+</file>
+
+<file path=ppt/slides/slide14.xml><?xml version="1.0" encoding="utf-8"?>
+<p:sld xmlns:a="http://schemas.openxmlformats.org/drawingml/2006/main" xmlns:r="http://schemas.openxmlformats.org/officeDocument/2006/relationships" xmlns:p="http://schemas.openxmlformats.org/presentationml/2006/main">
+  <p:cSld>
+    <p:spTree>
+      <p:nvGrpSpPr>
+        <p:cNvPr id="1" name=""/>
+        <p:cNvGrpSpPr/>
+        <p:nvPr/>
+      </p:nvGrpSpPr>
+      <p:grpSpPr>
+        <a:xfrm>
+          <a:off x="0" y="0"/>
+          <a:ext cx="0" cy="0"/>
+          <a:chOff x="0" y="0"/>
+          <a:chExt cx="0" cy="0"/>
+        </a:xfrm>
+      </p:grpSpPr>
+      <p:sp>
+        <p:nvSpPr>
+          <p:cNvPr id="2" name="Title 1"/>
+          <p:cNvSpPr>
+            <a:spLocks noGrp="1"/>
+          </p:cNvSpPr>
+          <p:nvPr>
+            <p:ph type="title"/>
+          </p:nvPr>
+        </p:nvSpPr>
+        <p:spPr/>
+        <p:txBody>
+          <a:bodyPr/>
+          <a:lstStyle/>
+          <a:p>
+            <a:endParaRPr lang="en-US"/>
+          </a:p>
+        </p:txBody>
+      </p:sp>
+      <p:pic>
+        <p:nvPicPr>
+          <p:cNvPr id="6146" name="Picture 2" descr="Image for post"/>
+          <p:cNvPicPr>
+            <a:picLocks noGrp="1" noChangeAspect="1" noChangeArrowheads="1"/>
+          </p:cNvPicPr>
+          <p:nvPr>
+            <p:ph idx="1"/>
+          </p:nvPr>
+        </p:nvPicPr>
+        <p:blipFill>
+          <a:blip r:embed="rId2">
+            <a:extLst>
+              <a:ext uri="{28A0092B-C50C-407E-A947-70E740481C1C}">
+                <a14:useLocalDpi xmlns:a14="http://schemas.microsoft.com/office/drawing/2010/main" val="0"/>
+              </a:ext>
+            </a:extLst>
+          </a:blip>
+          <a:srcRect/>
+          <a:stretch>
+            <a:fillRect/>
+          </a:stretch>
+        </p:blipFill>
+        <p:spPr bwMode="auto">
+          <a:xfrm>
+            <a:off x="1581150" y="2905919"/>
+            <a:ext cx="9029700" cy="2190750"/>
+          </a:xfrm>
+          <a:prstGeom prst="rect">
+            <a:avLst/>
+          </a:prstGeom>
+          <a:noFill/>
+          <a:extLst>
+            <a:ext uri="{909E8E84-426E-40DD-AFC4-6F175D3DCCD1}">
+              <a14:hiddenFill xmlns:a14="http://schemas.microsoft.com/office/drawing/2010/main">
+                <a:solidFill>
+                  <a:srgbClr val="FFFFFF"/>
+                </a:solidFill>
+              </a14:hiddenFill>
+            </a:ext>
+          </a:extLst>
+        </p:spPr>
+      </p:pic>
+    </p:spTree>
+    <p:extLst>
+      <p:ext uri="{BB962C8B-B14F-4D97-AF65-F5344CB8AC3E}">
+        <p14:creationId xmlns:p14="http://schemas.microsoft.com/office/powerpoint/2010/main" val="2931463693"/>
+      </p:ext>
+    </p:extLst>
+  </p:cSld>
+  <p:clrMapOvr>
+    <a:masterClrMapping/>
+  </p:clrMapOvr>
+</p:sld>
+</file>
+
+<file path=ppt/slides/slide15.xml><?xml version="1.0" encoding="utf-8"?>
+<p:sld xmlns:a="http://schemas.openxmlformats.org/drawingml/2006/main" xmlns:r="http://schemas.openxmlformats.org/officeDocument/2006/relationships" xmlns:p="http://schemas.openxmlformats.org/presentationml/2006/main">
+  <p:cSld>
+    <p:spTree>
+      <p:nvGrpSpPr>
+        <p:cNvPr id="1" name=""/>
+        <p:cNvGrpSpPr/>
+        <p:nvPr/>
+      </p:nvGrpSpPr>
+      <p:grpSpPr>
+        <a:xfrm>
+          <a:off x="0" y="0"/>
+          <a:ext cx="0" cy="0"/>
+          <a:chOff x="0" y="0"/>
+          <a:chExt cx="0" cy="0"/>
+        </a:xfrm>
+      </p:grpSpPr>
+      <p:sp>
+        <p:nvSpPr>
+          <p:cNvPr id="2" name="Title 1"/>
+          <p:cNvSpPr>
+            <a:spLocks noGrp="1"/>
+          </p:cNvSpPr>
+          <p:nvPr>
+            <p:ph type="title"/>
+          </p:nvPr>
+        </p:nvSpPr>
+        <p:spPr/>
+        <p:txBody>
+          <a:bodyPr/>
+          <a:lstStyle/>
+          <a:p>
+            <a:r>
               <a:rPr lang="en-US" smtClean="0"/>
               <a:t>VGG16 model concept</a:t>
             </a:r>
@@ -3387,6 +3834,81 @@
           <a:bodyPr/>
           <a:lstStyle/>
           <a:p>
+            <a:endParaRPr lang="en-US"/>
+          </a:p>
+        </p:txBody>
+      </p:sp>
+      <p:pic>
+        <p:nvPicPr>
+          <p:cNvPr id="6" name="Content Placeholder 5"/>
+          <p:cNvPicPr>
+            <a:picLocks noGrp="1" noChangeAspect="1"/>
+          </p:cNvPicPr>
+          <p:nvPr>
+            <p:ph idx="1"/>
+          </p:nvPr>
+        </p:nvPicPr>
+        <p:blipFill>
+          <a:blip r:embed="rId2"/>
+          <a:stretch>
+            <a:fillRect/>
+          </a:stretch>
+        </p:blipFill>
+        <p:spPr>
+          <a:xfrm>
+            <a:off x="-1" y="0"/>
+            <a:ext cx="12191999" cy="6858000"/>
+          </a:xfrm>
+          <a:prstGeom prst="rect">
+            <a:avLst/>
+          </a:prstGeom>
+        </p:spPr>
+      </p:pic>
+    </p:spTree>
+    <p:extLst>
+      <p:ext uri="{BB962C8B-B14F-4D97-AF65-F5344CB8AC3E}">
+        <p14:creationId xmlns:p14="http://schemas.microsoft.com/office/powerpoint/2010/main" val="768392904"/>
+      </p:ext>
+    </p:extLst>
+  </p:cSld>
+  <p:clrMapOvr>
+    <a:masterClrMapping/>
+  </p:clrMapOvr>
+</p:sld>
+</file>
+
+<file path=ppt/slides/slide5.xml><?xml version="1.0" encoding="utf-8"?>
+<p:sld xmlns:a="http://schemas.openxmlformats.org/drawingml/2006/main" xmlns:r="http://schemas.openxmlformats.org/officeDocument/2006/relationships" xmlns:p="http://schemas.openxmlformats.org/presentationml/2006/main">
+  <p:cSld>
+    <p:spTree>
+      <p:nvGrpSpPr>
+        <p:cNvPr id="1" name=""/>
+        <p:cNvGrpSpPr/>
+        <p:nvPr/>
+      </p:nvGrpSpPr>
+      <p:grpSpPr>
+        <a:xfrm>
+          <a:off x="0" y="0"/>
+          <a:ext cx="0" cy="0"/>
+          <a:chOff x="0" y="0"/>
+          <a:chExt cx="0" cy="0"/>
+        </a:xfrm>
+      </p:grpSpPr>
+      <p:sp>
+        <p:nvSpPr>
+          <p:cNvPr id="2" name="Title 1"/>
+          <p:cNvSpPr>
+            <a:spLocks noGrp="1"/>
+          </p:cNvSpPr>
+          <p:nvPr>
+            <p:ph type="title"/>
+          </p:nvPr>
+        </p:nvSpPr>
+        <p:spPr/>
+        <p:txBody>
+          <a:bodyPr/>
+          <a:lstStyle/>
+          <a:p>
             <a:r>
               <a:rPr lang="vi-VN" dirty="0" smtClean="0"/>
               <a:t>Convolution layer </a:t>
@@ -3434,10 +3956,17 @@
   <p:clrMapOvr>
     <a:masterClrMapping/>
   </p:clrMapOvr>
+  <p:timing>
+    <p:tnLst>
+      <p:par>
+        <p:cTn id="1" dur="indefinite" restart="never" nodeType="tmRoot"/>
+      </p:par>
+    </p:tnLst>
+  </p:timing>
 </p:sld>
 </file>
 
-<file path=ppt/slides/slide5.xml><?xml version="1.0" encoding="utf-8"?>
+<file path=ppt/slides/slide6.xml><?xml version="1.0" encoding="utf-8"?>
 <p:sld xmlns:a="http://schemas.openxmlformats.org/drawingml/2006/main" xmlns:r="http://schemas.openxmlformats.org/officeDocument/2006/relationships" xmlns:p="http://schemas.openxmlformats.org/presentationml/2006/main">
   <p:cSld>
     <p:spTree>
@@ -3533,7 +4062,7 @@
 </p:sld>
 </file>
 
-<file path=ppt/slides/slide6.xml><?xml version="1.0" encoding="utf-8"?>
+<file path=ppt/slides/slide7.xml><?xml version="1.0" encoding="utf-8"?>
 <p:sld xmlns:a="http://schemas.openxmlformats.org/drawingml/2006/main" xmlns:r="http://schemas.openxmlformats.org/officeDocument/2006/relationships" xmlns:p="http://schemas.openxmlformats.org/presentationml/2006/main">
   <p:cSld>
     <p:spTree>
@@ -3565,61 +4094,40 @@
           <a:bodyPr/>
           <a:lstStyle/>
           <a:p>
-            <a:r>
-              <a:rPr lang="vi-VN" dirty="0" smtClean="0"/>
-              <a:t>Softmax function</a:t>
-            </a:r>
-            <a:endParaRPr lang="en-US" dirty="0"/>
+            <a:endParaRPr lang="en-US"/>
           </a:p>
         </p:txBody>
       </p:sp>
       <p:pic>
         <p:nvPicPr>
-          <p:cNvPr id="3074" name="Picture 2" descr="Image for post"/>
+          <p:cNvPr id="6" name="Content Placeholder 5"/>
           <p:cNvPicPr>
-            <a:picLocks noGrp="1" noChangeAspect="1" noChangeArrowheads="1"/>
+            <a:picLocks noGrp="1" noChangeAspect="1"/>
           </p:cNvPicPr>
           <p:nvPr>
             <p:ph idx="1"/>
           </p:nvPr>
         </p:nvPicPr>
         <p:blipFill>
-          <a:blip r:embed="rId2">
-            <a:extLst>
-              <a:ext uri="{28A0092B-C50C-407E-A947-70E740481C1C}">
-                <a14:useLocalDpi xmlns:a14="http://schemas.microsoft.com/office/drawing/2010/main" val="0"/>
-              </a:ext>
-            </a:extLst>
-          </a:blip>
-          <a:srcRect/>
+          <a:blip r:embed="rId2"/>
           <a:stretch>
             <a:fillRect/>
           </a:stretch>
         </p:blipFill>
-        <p:spPr bwMode="auto">
+        <p:spPr>
           <a:xfrm>
-            <a:off x="3957637" y="2991644"/>
-            <a:ext cx="4276725" cy="2019300"/>
+            <a:off x="0" y="0"/>
+            <a:ext cx="12192000" cy="6858000"/>
           </a:xfrm>
           <a:prstGeom prst="rect">
             <a:avLst/>
           </a:prstGeom>
-          <a:noFill/>
-          <a:extLst>
-            <a:ext uri="{909E8E84-426E-40DD-AFC4-6F175D3DCCD1}">
-              <a14:hiddenFill xmlns:a14="http://schemas.microsoft.com/office/drawing/2010/main">
-                <a:solidFill>
-                  <a:srgbClr val="FFFFFF"/>
-                </a:solidFill>
-              </a14:hiddenFill>
-            </a:ext>
-          </a:extLst>
         </p:spPr>
       </p:pic>
     </p:spTree>
     <p:extLst>
       <p:ext uri="{BB962C8B-B14F-4D97-AF65-F5344CB8AC3E}">
-        <p14:creationId xmlns:p14="http://schemas.microsoft.com/office/powerpoint/2010/main" val="4257556904"/>
+        <p14:creationId xmlns:p14="http://schemas.microsoft.com/office/powerpoint/2010/main" val="811960443"/>
       </p:ext>
     </p:extLst>
   </p:cSld>
@@ -3629,7 +4137,82 @@
 </p:sld>
 </file>
 
-<file path=ppt/slides/slide7.xml><?xml version="1.0" encoding="utf-8"?>
+<file path=ppt/slides/slide8.xml><?xml version="1.0" encoding="utf-8"?>
+<p:sld xmlns:a="http://schemas.openxmlformats.org/drawingml/2006/main" xmlns:r="http://schemas.openxmlformats.org/officeDocument/2006/relationships" xmlns:p="http://schemas.openxmlformats.org/presentationml/2006/main">
+  <p:cSld>
+    <p:spTree>
+      <p:nvGrpSpPr>
+        <p:cNvPr id="1" name=""/>
+        <p:cNvGrpSpPr/>
+        <p:nvPr/>
+      </p:nvGrpSpPr>
+      <p:grpSpPr>
+        <a:xfrm>
+          <a:off x="0" y="0"/>
+          <a:ext cx="0" cy="0"/>
+          <a:chOff x="0" y="0"/>
+          <a:chExt cx="0" cy="0"/>
+        </a:xfrm>
+      </p:grpSpPr>
+      <p:sp>
+        <p:nvSpPr>
+          <p:cNvPr id="2" name="Title 1"/>
+          <p:cNvSpPr>
+            <a:spLocks noGrp="1"/>
+          </p:cNvSpPr>
+          <p:nvPr>
+            <p:ph type="title"/>
+          </p:nvPr>
+        </p:nvSpPr>
+        <p:spPr/>
+        <p:txBody>
+          <a:bodyPr/>
+          <a:lstStyle/>
+          <a:p>
+            <a:endParaRPr lang="en-US"/>
+          </a:p>
+        </p:txBody>
+      </p:sp>
+      <p:pic>
+        <p:nvPicPr>
+          <p:cNvPr id="5" name="Content Placeholder 4"/>
+          <p:cNvPicPr>
+            <a:picLocks noGrp="1" noChangeAspect="1"/>
+          </p:cNvPicPr>
+          <p:nvPr>
+            <p:ph idx="1"/>
+          </p:nvPr>
+        </p:nvPicPr>
+        <p:blipFill>
+          <a:blip r:embed="rId2"/>
+          <a:stretch>
+            <a:fillRect/>
+          </a:stretch>
+        </p:blipFill>
+        <p:spPr>
+          <a:xfrm>
+            <a:off x="0" y="0"/>
+            <a:ext cx="12192000" cy="6858000"/>
+          </a:xfrm>
+          <a:prstGeom prst="rect">
+            <a:avLst/>
+          </a:prstGeom>
+        </p:spPr>
+      </p:pic>
+    </p:spTree>
+    <p:extLst>
+      <p:ext uri="{BB962C8B-B14F-4D97-AF65-F5344CB8AC3E}">
+        <p14:creationId xmlns:p14="http://schemas.microsoft.com/office/powerpoint/2010/main" val="1006817452"/>
+      </p:ext>
+    </p:extLst>
+  </p:cSld>
+  <p:clrMapOvr>
+    <a:masterClrMapping/>
+  </p:clrMapOvr>
+</p:sld>
+</file>
+
+<file path=ppt/slides/slide9.xml><?xml version="1.0" encoding="utf-8"?>
 <p:sld xmlns:a="http://schemas.openxmlformats.org/drawingml/2006/main" xmlns:r="http://schemas.openxmlformats.org/officeDocument/2006/relationships" xmlns:p="http://schemas.openxmlformats.org/presentationml/2006/main">
   <p:cSld>
     <p:spTree>
@@ -3716,194 +4299,6 @@
     <p:extLst>
       <p:ext uri="{BB962C8B-B14F-4D97-AF65-F5344CB8AC3E}">
         <p14:creationId xmlns:p14="http://schemas.microsoft.com/office/powerpoint/2010/main" val="1414365083"/>
-      </p:ext>
-    </p:extLst>
-  </p:cSld>
-  <p:clrMapOvr>
-    <a:masterClrMapping/>
-  </p:clrMapOvr>
-</p:sld>
-</file>
-
-<file path=ppt/slides/slide8.xml><?xml version="1.0" encoding="utf-8"?>
-<p:sld xmlns:a="http://schemas.openxmlformats.org/drawingml/2006/main" xmlns:r="http://schemas.openxmlformats.org/officeDocument/2006/relationships" xmlns:p="http://schemas.openxmlformats.org/presentationml/2006/main">
-  <p:cSld>
-    <p:spTree>
-      <p:nvGrpSpPr>
-        <p:cNvPr id="1" name=""/>
-        <p:cNvGrpSpPr/>
-        <p:nvPr/>
-      </p:nvGrpSpPr>
-      <p:grpSpPr>
-        <a:xfrm>
-          <a:off x="0" y="0"/>
-          <a:ext cx="0" cy="0"/>
-          <a:chOff x="0" y="0"/>
-          <a:chExt cx="0" cy="0"/>
-        </a:xfrm>
-      </p:grpSpPr>
-      <p:sp>
-        <p:nvSpPr>
-          <p:cNvPr id="2" name="Title 1"/>
-          <p:cNvSpPr>
-            <a:spLocks noGrp="1"/>
-          </p:cNvSpPr>
-          <p:nvPr>
-            <p:ph type="title"/>
-          </p:nvPr>
-        </p:nvSpPr>
-        <p:spPr/>
-        <p:txBody>
-          <a:bodyPr/>
-          <a:lstStyle/>
-          <a:p>
-            <a:r>
-              <a:rPr lang="vi-VN" dirty="0" smtClean="0"/>
-              <a:t>Fully connected layer </a:t>
-            </a:r>
-            <a:endParaRPr lang="en-US" dirty="0"/>
-          </a:p>
-        </p:txBody>
-      </p:sp>
-      <p:pic>
-        <p:nvPicPr>
-          <p:cNvPr id="5122" name="Picture 2" descr="Image for post"/>
-          <p:cNvPicPr>
-            <a:picLocks noGrp="1" noChangeAspect="1" noChangeArrowheads="1"/>
-          </p:cNvPicPr>
-          <p:nvPr>
-            <p:ph idx="1"/>
-          </p:nvPr>
-        </p:nvPicPr>
-        <p:blipFill>
-          <a:blip r:embed="rId2">
-            <a:extLst>
-              <a:ext uri="{28A0092B-C50C-407E-A947-70E740481C1C}">
-                <a14:useLocalDpi xmlns:a14="http://schemas.microsoft.com/office/drawing/2010/main" val="0"/>
-              </a:ext>
-            </a:extLst>
-          </a:blip>
-          <a:srcRect/>
-          <a:stretch>
-            <a:fillRect/>
-          </a:stretch>
-        </p:blipFill>
-        <p:spPr bwMode="auto">
-          <a:xfrm>
-            <a:off x="3457575" y="2572544"/>
-            <a:ext cx="5276850" cy="2857500"/>
-          </a:xfrm>
-          <a:prstGeom prst="rect">
-            <a:avLst/>
-          </a:prstGeom>
-          <a:noFill/>
-          <a:extLst>
-            <a:ext uri="{909E8E84-426E-40DD-AFC4-6F175D3DCCD1}">
-              <a14:hiddenFill xmlns:a14="http://schemas.microsoft.com/office/drawing/2010/main">
-                <a:solidFill>
-                  <a:srgbClr val="FFFFFF"/>
-                </a:solidFill>
-              </a14:hiddenFill>
-            </a:ext>
-          </a:extLst>
-        </p:spPr>
-      </p:pic>
-    </p:spTree>
-    <p:extLst>
-      <p:ext uri="{BB962C8B-B14F-4D97-AF65-F5344CB8AC3E}">
-        <p14:creationId xmlns:p14="http://schemas.microsoft.com/office/powerpoint/2010/main" val="3594928109"/>
-      </p:ext>
-    </p:extLst>
-  </p:cSld>
-  <p:clrMapOvr>
-    <a:masterClrMapping/>
-  </p:clrMapOvr>
-</p:sld>
-</file>
-
-<file path=ppt/slides/slide9.xml><?xml version="1.0" encoding="utf-8"?>
-<p:sld xmlns:a="http://schemas.openxmlformats.org/drawingml/2006/main" xmlns:r="http://schemas.openxmlformats.org/officeDocument/2006/relationships" xmlns:p="http://schemas.openxmlformats.org/presentationml/2006/main">
-  <p:cSld>
-    <p:spTree>
-      <p:nvGrpSpPr>
-        <p:cNvPr id="1" name=""/>
-        <p:cNvGrpSpPr/>
-        <p:nvPr/>
-      </p:nvGrpSpPr>
-      <p:grpSpPr>
-        <a:xfrm>
-          <a:off x="0" y="0"/>
-          <a:ext cx="0" cy="0"/>
-          <a:chOff x="0" y="0"/>
-          <a:chExt cx="0" cy="0"/>
-        </a:xfrm>
-      </p:grpSpPr>
-      <p:sp>
-        <p:nvSpPr>
-          <p:cNvPr id="2" name="Title 1"/>
-          <p:cNvSpPr>
-            <a:spLocks noGrp="1"/>
-          </p:cNvSpPr>
-          <p:nvPr>
-            <p:ph type="title"/>
-          </p:nvPr>
-        </p:nvSpPr>
-        <p:spPr/>
-        <p:txBody>
-          <a:bodyPr/>
-          <a:lstStyle/>
-          <a:p>
-            <a:endParaRPr lang="en-US"/>
-          </a:p>
-        </p:txBody>
-      </p:sp>
-      <p:pic>
-        <p:nvPicPr>
-          <p:cNvPr id="6146" name="Picture 2" descr="Image for post"/>
-          <p:cNvPicPr>
-            <a:picLocks noGrp="1" noChangeAspect="1" noChangeArrowheads="1"/>
-          </p:cNvPicPr>
-          <p:nvPr>
-            <p:ph idx="1"/>
-          </p:nvPr>
-        </p:nvPicPr>
-        <p:blipFill>
-          <a:blip r:embed="rId2">
-            <a:extLst>
-              <a:ext uri="{28A0092B-C50C-407E-A947-70E740481C1C}">
-                <a14:useLocalDpi xmlns:a14="http://schemas.microsoft.com/office/drawing/2010/main" val="0"/>
-              </a:ext>
-            </a:extLst>
-          </a:blip>
-          <a:srcRect/>
-          <a:stretch>
-            <a:fillRect/>
-          </a:stretch>
-        </p:blipFill>
-        <p:spPr bwMode="auto">
-          <a:xfrm>
-            <a:off x="1581150" y="2905919"/>
-            <a:ext cx="9029700" cy="2190750"/>
-          </a:xfrm>
-          <a:prstGeom prst="rect">
-            <a:avLst/>
-          </a:prstGeom>
-          <a:noFill/>
-          <a:extLst>
-            <a:ext uri="{909E8E84-426E-40DD-AFC4-6F175D3DCCD1}">
-              <a14:hiddenFill xmlns:a14="http://schemas.microsoft.com/office/drawing/2010/main">
-                <a:solidFill>
-                  <a:srgbClr val="FFFFFF"/>
-                </a:solidFill>
-              </a14:hiddenFill>
-            </a:ext>
-          </a:extLst>
-        </p:spPr>
-      </p:pic>
-    </p:spTree>
-    <p:extLst>
-      <p:ext uri="{BB962C8B-B14F-4D97-AF65-F5344CB8AC3E}">
-        <p14:creationId xmlns:p14="http://schemas.microsoft.com/office/powerpoint/2010/main" val="2931463693"/>
       </p:ext>
     </p:extLst>
   </p:cSld>

</xml_diff>